<commit_message>
Code & slide changes
</commit_message>
<xml_diff>
--- a/datenmodellierung.pptx
+++ b/datenmodellierung.pptx
@@ -9,8 +9,8 @@
   </p:notesMasterIdLst>
   <p:sldIdLst>
     <p:sldId id="256" r:id="rId2"/>
-    <p:sldId id="442" r:id="rId3"/>
-    <p:sldId id="443" r:id="rId4"/>
+    <p:sldId id="443" r:id="rId3"/>
+    <p:sldId id="442" r:id="rId4"/>
     <p:sldId id="444" r:id="rId5"/>
     <p:sldId id="441" r:id="rId6"/>
   </p:sldIdLst>
@@ -117,8 +117,8 @@
         <p14:section name="Default Section" id="{C93E1C98-91EF-F545-8671-9396061E777A}">
           <p14:sldIdLst>
             <p14:sldId id="256"/>
+            <p14:sldId id="443"/>
             <p14:sldId id="442"/>
-            <p14:sldId id="443"/>
             <p14:sldId id="444"/>
             <p14:sldId id="441"/>
           </p14:sldIdLst>
@@ -664,7 +664,7 @@
           <a:p>
             <a:fld id="{D27F9AF4-99BD-704C-A634-BD68D2954485}" type="slidenum">
               <a:rPr lang="en-DE"/>
-              <a:t>2</a:t>
+              <a:t>3</a:t>
             </a:fld>
             <a:endParaRPr lang="en-DE"/>
           </a:p>
@@ -3731,73 +3731,12 @@
           <a:chExt cx="0" cy="0"/>
         </a:xfrm>
       </p:grpSpPr>
-      <p:sp>
-        <p:nvSpPr>
-          <p:cNvPr id="2" name="Title 1"/>
-          <p:cNvSpPr>
-            <a:spLocks noGrp="1"/>
-          </p:cNvSpPr>
-          <p:nvPr>
-            <p:ph type="ctrTitle"/>
-          </p:nvPr>
-        </p:nvSpPr>
-        <p:spPr>
-          <a:xfrm>
-            <a:off x="2209799" y="1649520"/>
-            <a:ext cx="7772400" cy="1470025"/>
-          </a:xfrm>
-        </p:spPr>
-        <p:txBody>
-          <a:bodyPr>
-            <a:noAutofit/>
-          </a:bodyPr>
-          <a:lstStyle/>
-          <a:p>
-            <a:pPr algn="ctr"/>
-            <a:r>
-              <a:rPr lang="en-US"/>
-              <a:t>Mit Datenmodellierung mehr Fachlichkeit herauskitzeln</a:t>
-            </a:r>
-            <a:endParaRPr lang="en-US" sz="4800" dirty="0"/>
-          </a:p>
-        </p:txBody>
-      </p:sp>
-    </p:spTree>
-    <p:extLst>
-      <p:ext uri="{BB962C8B-B14F-4D97-AF65-F5344CB8AC3E}">
-        <p14:creationId xmlns:p14="http://schemas.microsoft.com/office/powerpoint/2010/main" val="2610887401"/>
-      </p:ext>
-    </p:extLst>
-  </p:cSld>
-  <p:clrMapOvr>
-    <a:masterClrMapping/>
-  </p:clrMapOvr>
-</p:sld>
-</file>
-
-<file path=ppt/slides/slide2.xml><?xml version="1.0" encoding="utf-8"?>
-<p:sld xmlns:a="http://schemas.openxmlformats.org/drawingml/2006/main" xmlns:r="http://schemas.openxmlformats.org/officeDocument/2006/relationships" xmlns:p="http://schemas.openxmlformats.org/presentationml/2006/main">
-  <p:cSld>
-    <p:spTree>
-      <p:nvGrpSpPr>
-        <p:cNvPr id="1" name=""/>
-        <p:cNvGrpSpPr/>
-        <p:nvPr/>
-      </p:nvGrpSpPr>
-      <p:grpSpPr>
-        <a:xfrm>
-          <a:off x="0" y="0"/>
-          <a:ext cx="0" cy="0"/>
-          <a:chOff x="0" y="0"/>
-          <a:chExt cx="0" cy="0"/>
-        </a:xfrm>
-      </p:grpSpPr>
       <p:pic>
         <p:nvPicPr>
-          <p:cNvPr id="3078" name="Picture 6">
+          <p:cNvPr id="1028" name="Picture 4" descr="Individuelle E-Commerce-Softwarelösungen | neuland - Büro für Informatik">
             <a:extLst>
               <a:ext uri="{FF2B5EF4-FFF2-40B4-BE49-F238E27FC236}">
-                <a16:creationId xmlns:a16="http://schemas.microsoft.com/office/drawing/2014/main" id="{F683BD2E-3271-70A0-C455-3370322BD997}"/>
+                <a16:creationId xmlns:a16="http://schemas.microsoft.com/office/drawing/2014/main" id="{08193236-2A66-6EDF-1C42-A14CBCD4C625}"/>
               </a:ext>
             </a:extLst>
           </p:cNvPr>
@@ -3821,8 +3760,8 @@
         </p:blipFill>
         <p:spPr bwMode="auto">
           <a:xfrm>
-            <a:off x="7210322" y="731836"/>
-            <a:ext cx="1795856" cy="2025613"/>
+            <a:off x="320231" y="3664996"/>
+            <a:ext cx="5879939" cy="3086968"/>
           </a:xfrm>
           <a:prstGeom prst="rect">
             <a:avLst/>
@@ -3841,243 +3780,132 @@
       </p:pic>
       <p:sp>
         <p:nvSpPr>
-          <p:cNvPr id="2" name="Title 1">
+          <p:cNvPr id="2" name="Title 1"/>
+          <p:cNvSpPr>
+            <a:spLocks noGrp="1"/>
+          </p:cNvSpPr>
+          <p:nvPr>
+            <p:ph type="ctrTitle"/>
+          </p:nvPr>
+        </p:nvSpPr>
+        <p:spPr>
+          <a:xfrm>
+            <a:off x="2209799" y="1649520"/>
+            <a:ext cx="7772400" cy="1470025"/>
+          </a:xfrm>
+        </p:spPr>
+        <p:txBody>
+          <a:bodyPr>
+            <a:noAutofit/>
+          </a:bodyPr>
+          <a:lstStyle/>
+          <a:p>
+            <a:pPr algn="ctr"/>
+            <a:r>
+              <a:rPr lang="en-US"/>
+              <a:t>Mit Datenmodellierung mehr Fachlichkeit herauskitzeln</a:t>
+            </a:r>
+            <a:endParaRPr lang="en-US" sz="4800" dirty="0"/>
+          </a:p>
+        </p:txBody>
+      </p:sp>
+      <p:sp>
+        <p:nvSpPr>
+          <p:cNvPr id="3" name="TextBox 2">
             <a:extLst>
               <a:ext uri="{FF2B5EF4-FFF2-40B4-BE49-F238E27FC236}">
-                <a16:creationId xmlns:a16="http://schemas.microsoft.com/office/drawing/2014/main" id="{103ED4E4-FA3F-10CE-2985-F8C5A67AF12C}"/>
+                <a16:creationId xmlns:a16="http://schemas.microsoft.com/office/drawing/2014/main" id="{9CC92057-13C7-5D59-66F8-9C5764E0483B}"/>
               </a:ext>
             </a:extLst>
           </p:cNvPr>
-          <p:cNvSpPr>
-            <a:spLocks noGrp="1"/>
-          </p:cNvSpPr>
-          <p:nvPr>
-            <p:ph type="title"/>
-          </p:nvPr>
-        </p:nvSpPr>
-        <p:spPr/>
-        <p:txBody>
-          <a:bodyPr/>
-          <a:lstStyle/>
-          <a:p>
-            <a:r>
-              <a:rPr lang="de-DE"/>
-              <a:t>Warenkorb</a:t>
-            </a:r>
-            <a:endParaRPr lang="en-DE"/>
-          </a:p>
-        </p:txBody>
-      </p:sp>
-      <p:sp>
-        <p:nvSpPr>
-          <p:cNvPr id="3" name="Content Placeholder 2">
+          <p:cNvSpPr txBox="1"/>
+          <p:nvPr/>
+        </p:nvSpPr>
+        <p:spPr>
+          <a:xfrm>
+            <a:off x="3156029" y="3138291"/>
+            <a:ext cx="5879939" cy="1200329"/>
+          </a:xfrm>
+          <a:prstGeom prst="rect">
+            <a:avLst/>
+          </a:prstGeom>
+          <a:noFill/>
+        </p:spPr>
+        <p:txBody>
+          <a:bodyPr wrap="square" rtlCol="0">
+            <a:spAutoFit/>
+          </a:bodyPr>
+          <a:lstStyle/>
+          <a:p>
+            <a:pPr algn="ctr"/>
+            <a:r>
+              <a:rPr lang="en-US"/>
+              <a:t>Olaf Sebelin</a:t>
+            </a:r>
+          </a:p>
+          <a:p>
+            <a:pPr algn="ctr"/>
+            <a:r>
+              <a:rPr lang="en-US"/>
+              <a:t>Mike Sperber</a:t>
+            </a:r>
+          </a:p>
+          <a:p>
+            <a:pPr algn="ctr"/>
+            <a:r>
+              <a:rPr lang="en-US"/>
+              <a:t>Simone Kämpf</a:t>
+            </a:r>
+          </a:p>
+          <a:p>
+            <a:pPr algn="ctr"/>
+            <a:r>
+              <a:rPr lang="en-US"/>
+              <a:t>Bianca Lutz</a:t>
+            </a:r>
+          </a:p>
+        </p:txBody>
+      </p:sp>
+      <p:pic>
+        <p:nvPicPr>
+          <p:cNvPr id="7" name="Graphic 6">
             <a:extLst>
               <a:ext uri="{FF2B5EF4-FFF2-40B4-BE49-F238E27FC236}">
-                <a16:creationId xmlns:a16="http://schemas.microsoft.com/office/drawing/2014/main" id="{A4395F28-162E-C217-7E1E-E3A06220B39E}"/>
-              </a:ext>
-            </a:extLst>
-          </p:cNvPr>
-          <p:cNvSpPr>
-            <a:spLocks noGrp="1"/>
-          </p:cNvSpPr>
-          <p:nvPr>
-            <p:ph idx="1"/>
-          </p:nvPr>
-        </p:nvSpPr>
-        <p:spPr/>
-        <p:txBody>
-          <a:bodyPr/>
-          <a:lstStyle/>
-          <a:p>
-            <a:r>
-              <a:rPr lang="de-DE"/>
-              <a:t>Ding in den Korb tun</a:t>
-            </a:r>
-          </a:p>
-          <a:p>
-            <a:r>
-              <a:rPr lang="de-DE"/>
-              <a:t>Lieferadresse auswählen</a:t>
-            </a:r>
-            <a:endParaRPr lang="en-DE"/>
-          </a:p>
-          <a:p>
-            <a:r>
-              <a:rPr lang="de-DE"/>
-              <a:t>zum Checkout gehen</a:t>
-            </a:r>
-            <a:endParaRPr lang="en-DE"/>
-          </a:p>
-          <a:p>
-            <a:r>
-              <a:rPr lang="de-DE"/>
-              <a:t>keine Möbel an </a:t>
-            </a:r>
-            <a:r>
-              <a:rPr lang="en-DE"/>
-              <a:t>Packstation</a:t>
-            </a:r>
-            <a:endParaRPr lang="de-DE"/>
-          </a:p>
-          <a:p>
-            <a:r>
-              <a:rPr lang="de-DE"/>
-              <a:t>keine Eingaben verlieren</a:t>
-            </a:r>
-            <a:endParaRPr lang="en-DE"/>
-          </a:p>
-        </p:txBody>
-      </p:sp>
-      <p:pic>
-        <p:nvPicPr>
-          <p:cNvPr id="3074" name="Picture 2">
-            <a:extLst>
-              <a:ext uri="{FF2B5EF4-FFF2-40B4-BE49-F238E27FC236}">
-                <a16:creationId xmlns:a16="http://schemas.microsoft.com/office/drawing/2014/main" id="{EBFD7073-BE97-282D-C85F-D6BA2F671229}"/>
+                <a16:creationId xmlns:a16="http://schemas.microsoft.com/office/drawing/2014/main" id="{9AF56B5E-19F7-477D-6E1C-E4B41C822B1C}"/>
               </a:ext>
             </a:extLst>
           </p:cNvPr>
           <p:cNvPicPr>
-            <a:picLocks noChangeAspect="1" noChangeArrowheads="1"/>
+            <a:picLocks noChangeAspect="1"/>
           </p:cNvPicPr>
           <p:nvPr/>
         </p:nvPicPr>
         <p:blipFill>
           <a:blip r:embed="rId4">
             <a:extLst>
-              <a:ext uri="{28A0092B-C50C-407E-A947-70E740481C1C}">
-                <a14:useLocalDpi xmlns:a14="http://schemas.microsoft.com/office/drawing/2010/main" val="0"/>
+              <a:ext uri="{96DAC541-7B7A-43D3-8B79-37D633B846F1}">
+                <asvg:svgBlip xmlns:asvg="http://schemas.microsoft.com/office/drawing/2016/SVG/main" r:embed="rId5"/>
               </a:ext>
             </a:extLst>
           </a:blip>
-          <a:srcRect/>
           <a:stretch>
             <a:fillRect/>
           </a:stretch>
         </p:blipFill>
-        <p:spPr bwMode="auto">
+        <p:spPr>
           <a:xfrm>
-            <a:off x="7475260" y="2069827"/>
-            <a:ext cx="3853520" cy="4056337"/>
+            <a:off x="6095998" y="4552156"/>
+            <a:ext cx="5631083" cy="1986272"/>
           </a:xfrm>
           <a:prstGeom prst="rect">
             <a:avLst/>
           </a:prstGeom>
-          <a:noFill/>
-          <a:extLst>
-            <a:ext uri="{909E8E84-426E-40DD-AFC4-6F175D3DCCD1}">
-              <a14:hiddenFill xmlns:a14="http://schemas.microsoft.com/office/drawing/2010/main">
-                <a:solidFill>
-                  <a:srgbClr val="FFFFFF"/>
-                </a:solidFill>
-              </a14:hiddenFill>
-            </a:ext>
-          </a:extLst>
         </p:spPr>
       </p:pic>
-      <p:pic>
-        <p:nvPicPr>
-          <p:cNvPr id="3076" name="Picture 4">
-            <a:extLst>
-              <a:ext uri="{FF2B5EF4-FFF2-40B4-BE49-F238E27FC236}">
-                <a16:creationId xmlns:a16="http://schemas.microsoft.com/office/drawing/2014/main" id="{046B6B91-117C-C5AF-BC3F-95E2D55528CD}"/>
-              </a:ext>
-            </a:extLst>
-          </p:cNvPr>
-          <p:cNvPicPr>
-            <a:picLocks noChangeAspect="1" noChangeArrowheads="1"/>
-          </p:cNvPicPr>
-          <p:nvPr/>
-        </p:nvPicPr>
-        <p:blipFill>
-          <a:blip r:embed="rId5">
-            <a:extLst>
-              <a:ext uri="{28A0092B-C50C-407E-A947-70E740481C1C}">
-                <a14:useLocalDpi xmlns:a14="http://schemas.microsoft.com/office/drawing/2010/main" val="0"/>
-              </a:ext>
-            </a:extLst>
-          </a:blip>
-          <a:srcRect/>
-          <a:stretch>
-            <a:fillRect/>
-          </a:stretch>
-        </p:blipFill>
-        <p:spPr bwMode="auto">
-          <a:xfrm>
-            <a:off x="9206650" y="556161"/>
-            <a:ext cx="2070951" cy="1232144"/>
-          </a:xfrm>
-          <a:prstGeom prst="rect">
-            <a:avLst/>
-          </a:prstGeom>
-          <a:noFill/>
-          <a:extLst>
-            <a:ext uri="{909E8E84-426E-40DD-AFC4-6F175D3DCCD1}">
-              <a14:hiddenFill xmlns:a14="http://schemas.microsoft.com/office/drawing/2010/main">
-                <a:solidFill>
-                  <a:srgbClr val="FFFFFF"/>
-                </a:solidFill>
-              </a14:hiddenFill>
-            </a:ext>
-          </a:extLst>
-        </p:spPr>
-      </p:pic>
-      <p:sp>
-        <p:nvSpPr>
-          <p:cNvPr id="5" name="TextBox 4">
-            <a:extLst>
-              <a:ext uri="{FF2B5EF4-FFF2-40B4-BE49-F238E27FC236}">
-                <a16:creationId xmlns:a16="http://schemas.microsoft.com/office/drawing/2014/main" id="{2E651E4C-A14B-8B77-54B6-74206406EED6}"/>
-              </a:ext>
-            </a:extLst>
-          </p:cNvPr>
-          <p:cNvSpPr txBox="1"/>
-          <p:nvPr/>
-        </p:nvSpPr>
-        <p:spPr>
-          <a:xfrm>
-            <a:off x="6977111" y="6407686"/>
-            <a:ext cx="5214889" cy="369332"/>
-          </a:xfrm>
-          <a:prstGeom prst="rect">
-            <a:avLst/>
-          </a:prstGeom>
-          <a:noFill/>
-        </p:spPr>
-        <p:txBody>
-          <a:bodyPr wrap="none" rtlCol="0">
-            <a:spAutoFit/>
-          </a:bodyPr>
-          <a:lstStyle/>
-          <a:p>
-            <a:r>
-              <a:rPr lang="en-DE"/>
-              <a:t>Source: </a:t>
-            </a:r>
-            <a:r>
-              <a:rPr lang="en-GB">
-                <a:hlinkClick r:id="rId6"/>
-              </a:rPr>
-              <a:t>Wikimedia (sofa)</a:t>
-            </a:r>
-            <a:r>
-              <a:rPr lang="en-GB"/>
-              <a:t>, </a:t>
-            </a:r>
-            <a:r>
-              <a:rPr lang="en-GB">
-                <a:hlinkClick r:id="rId7"/>
-              </a:rPr>
-              <a:t>Wikimedia (candle diffuser)</a:t>
-            </a:r>
-            <a:endParaRPr lang="en-DE"/>
-          </a:p>
-        </p:txBody>
-      </p:sp>
     </p:spTree>
     <p:extLst>
       <p:ext uri="{BB962C8B-B14F-4D97-AF65-F5344CB8AC3E}">
-        <p14:creationId xmlns:p14="http://schemas.microsoft.com/office/powerpoint/2010/main" val="2158594933"/>
+        <p14:creationId xmlns:p14="http://schemas.microsoft.com/office/powerpoint/2010/main" val="2610887401"/>
       </p:ext>
     </p:extLst>
   </p:cSld>
@@ -4087,7 +3915,7 @@
 </p:sld>
 </file>
 
-<file path=ppt/slides/slide3.xml><?xml version="1.0" encoding="utf-8"?>
+<file path=ppt/slides/slide2.xml><?xml version="1.0" encoding="utf-8"?>
 <p:sld xmlns:a="http://schemas.openxmlformats.org/drawingml/2006/main" xmlns:r="http://schemas.openxmlformats.org/officeDocument/2006/relationships" xmlns:p="http://schemas.openxmlformats.org/presentationml/2006/main">
   <p:cSld>
     <p:spTree>
@@ -4525,6 +4353,323 @@
 </p:sld>
 </file>
 
+<file path=ppt/slides/slide3.xml><?xml version="1.0" encoding="utf-8"?>
+<p:sld xmlns:a="http://schemas.openxmlformats.org/drawingml/2006/main" xmlns:r="http://schemas.openxmlformats.org/officeDocument/2006/relationships" xmlns:p="http://schemas.openxmlformats.org/presentationml/2006/main">
+  <p:cSld>
+    <p:spTree>
+      <p:nvGrpSpPr>
+        <p:cNvPr id="1" name=""/>
+        <p:cNvGrpSpPr/>
+        <p:nvPr/>
+      </p:nvGrpSpPr>
+      <p:grpSpPr>
+        <a:xfrm>
+          <a:off x="0" y="0"/>
+          <a:ext cx="0" cy="0"/>
+          <a:chOff x="0" y="0"/>
+          <a:chExt cx="0" cy="0"/>
+        </a:xfrm>
+      </p:grpSpPr>
+      <p:pic>
+        <p:nvPicPr>
+          <p:cNvPr id="3078" name="Picture 6">
+            <a:extLst>
+              <a:ext uri="{FF2B5EF4-FFF2-40B4-BE49-F238E27FC236}">
+                <a16:creationId xmlns:a16="http://schemas.microsoft.com/office/drawing/2014/main" id="{F683BD2E-3271-70A0-C455-3370322BD997}"/>
+              </a:ext>
+            </a:extLst>
+          </p:cNvPr>
+          <p:cNvPicPr>
+            <a:picLocks noChangeAspect="1" noChangeArrowheads="1"/>
+          </p:cNvPicPr>
+          <p:nvPr/>
+        </p:nvPicPr>
+        <p:blipFill>
+          <a:blip r:embed="rId3">
+            <a:extLst>
+              <a:ext uri="{28A0092B-C50C-407E-A947-70E740481C1C}">
+                <a14:useLocalDpi xmlns:a14="http://schemas.microsoft.com/office/drawing/2010/main" val="0"/>
+              </a:ext>
+            </a:extLst>
+          </a:blip>
+          <a:srcRect/>
+          <a:stretch>
+            <a:fillRect/>
+          </a:stretch>
+        </p:blipFill>
+        <p:spPr bwMode="auto">
+          <a:xfrm>
+            <a:off x="7210322" y="731836"/>
+            <a:ext cx="1795856" cy="2025613"/>
+          </a:xfrm>
+          <a:prstGeom prst="rect">
+            <a:avLst/>
+          </a:prstGeom>
+          <a:noFill/>
+          <a:extLst>
+            <a:ext uri="{909E8E84-426E-40DD-AFC4-6F175D3DCCD1}">
+              <a14:hiddenFill xmlns:a14="http://schemas.microsoft.com/office/drawing/2010/main">
+                <a:solidFill>
+                  <a:srgbClr val="FFFFFF"/>
+                </a:solidFill>
+              </a14:hiddenFill>
+            </a:ext>
+          </a:extLst>
+        </p:spPr>
+      </p:pic>
+      <p:sp>
+        <p:nvSpPr>
+          <p:cNvPr id="2" name="Title 1">
+            <a:extLst>
+              <a:ext uri="{FF2B5EF4-FFF2-40B4-BE49-F238E27FC236}">
+                <a16:creationId xmlns:a16="http://schemas.microsoft.com/office/drawing/2014/main" id="{103ED4E4-FA3F-10CE-2985-F8C5A67AF12C}"/>
+              </a:ext>
+            </a:extLst>
+          </p:cNvPr>
+          <p:cNvSpPr>
+            <a:spLocks noGrp="1"/>
+          </p:cNvSpPr>
+          <p:nvPr>
+            <p:ph type="title"/>
+          </p:nvPr>
+        </p:nvSpPr>
+        <p:spPr/>
+        <p:txBody>
+          <a:bodyPr/>
+          <a:lstStyle/>
+          <a:p>
+            <a:r>
+              <a:rPr lang="de-DE"/>
+              <a:t>Warenkorb</a:t>
+            </a:r>
+            <a:endParaRPr lang="en-DE"/>
+          </a:p>
+        </p:txBody>
+      </p:sp>
+      <p:sp>
+        <p:nvSpPr>
+          <p:cNvPr id="3" name="Content Placeholder 2">
+            <a:extLst>
+              <a:ext uri="{FF2B5EF4-FFF2-40B4-BE49-F238E27FC236}">
+                <a16:creationId xmlns:a16="http://schemas.microsoft.com/office/drawing/2014/main" id="{A4395F28-162E-C217-7E1E-E3A06220B39E}"/>
+              </a:ext>
+            </a:extLst>
+          </p:cNvPr>
+          <p:cNvSpPr>
+            <a:spLocks noGrp="1"/>
+          </p:cNvSpPr>
+          <p:nvPr>
+            <p:ph idx="1"/>
+          </p:nvPr>
+        </p:nvSpPr>
+        <p:spPr/>
+        <p:txBody>
+          <a:bodyPr/>
+          <a:lstStyle/>
+          <a:p>
+            <a:r>
+              <a:rPr lang="de-DE"/>
+              <a:t>Ding in den Korb tun</a:t>
+            </a:r>
+          </a:p>
+          <a:p>
+            <a:r>
+              <a:rPr lang="de-DE"/>
+              <a:t>Lieferadresse auswählen</a:t>
+            </a:r>
+            <a:endParaRPr lang="en-DE"/>
+          </a:p>
+          <a:p>
+            <a:r>
+              <a:rPr lang="de-DE"/>
+              <a:t>zum Checkout gehen</a:t>
+            </a:r>
+          </a:p>
+          <a:p>
+            <a:pPr marL="0" indent="0">
+              <a:buNone/>
+            </a:pPr>
+            <a:endParaRPr lang="en-DE"/>
+          </a:p>
+          <a:p>
+            <a:r>
+              <a:rPr lang="de-DE"/>
+              <a:t>keine Möbel an </a:t>
+            </a:r>
+            <a:r>
+              <a:rPr lang="en-DE"/>
+              <a:t>Packstation</a:t>
+            </a:r>
+            <a:endParaRPr lang="de-DE"/>
+          </a:p>
+          <a:p>
+            <a:r>
+              <a:rPr lang="de-DE"/>
+              <a:t>keine Eingaben verlieren</a:t>
+            </a:r>
+            <a:endParaRPr lang="en-DE"/>
+          </a:p>
+        </p:txBody>
+      </p:sp>
+      <p:pic>
+        <p:nvPicPr>
+          <p:cNvPr id="3074" name="Picture 2">
+            <a:extLst>
+              <a:ext uri="{FF2B5EF4-FFF2-40B4-BE49-F238E27FC236}">
+                <a16:creationId xmlns:a16="http://schemas.microsoft.com/office/drawing/2014/main" id="{EBFD7073-BE97-282D-C85F-D6BA2F671229}"/>
+              </a:ext>
+            </a:extLst>
+          </p:cNvPr>
+          <p:cNvPicPr>
+            <a:picLocks noChangeAspect="1" noChangeArrowheads="1"/>
+          </p:cNvPicPr>
+          <p:nvPr/>
+        </p:nvPicPr>
+        <p:blipFill>
+          <a:blip r:embed="rId4">
+            <a:extLst>
+              <a:ext uri="{28A0092B-C50C-407E-A947-70E740481C1C}">
+                <a14:useLocalDpi xmlns:a14="http://schemas.microsoft.com/office/drawing/2010/main" val="0"/>
+              </a:ext>
+            </a:extLst>
+          </a:blip>
+          <a:srcRect/>
+          <a:stretch>
+            <a:fillRect/>
+          </a:stretch>
+        </p:blipFill>
+        <p:spPr bwMode="auto">
+          <a:xfrm>
+            <a:off x="7475260" y="2069827"/>
+            <a:ext cx="3853520" cy="4056337"/>
+          </a:xfrm>
+          <a:prstGeom prst="rect">
+            <a:avLst/>
+          </a:prstGeom>
+          <a:noFill/>
+          <a:extLst>
+            <a:ext uri="{909E8E84-426E-40DD-AFC4-6F175D3DCCD1}">
+              <a14:hiddenFill xmlns:a14="http://schemas.microsoft.com/office/drawing/2010/main">
+                <a:solidFill>
+                  <a:srgbClr val="FFFFFF"/>
+                </a:solidFill>
+              </a14:hiddenFill>
+            </a:ext>
+          </a:extLst>
+        </p:spPr>
+      </p:pic>
+      <p:pic>
+        <p:nvPicPr>
+          <p:cNvPr id="3076" name="Picture 4">
+            <a:extLst>
+              <a:ext uri="{FF2B5EF4-FFF2-40B4-BE49-F238E27FC236}">
+                <a16:creationId xmlns:a16="http://schemas.microsoft.com/office/drawing/2014/main" id="{046B6B91-117C-C5AF-BC3F-95E2D55528CD}"/>
+              </a:ext>
+            </a:extLst>
+          </p:cNvPr>
+          <p:cNvPicPr>
+            <a:picLocks noChangeAspect="1" noChangeArrowheads="1"/>
+          </p:cNvPicPr>
+          <p:nvPr/>
+        </p:nvPicPr>
+        <p:blipFill>
+          <a:blip r:embed="rId5">
+            <a:extLst>
+              <a:ext uri="{28A0092B-C50C-407E-A947-70E740481C1C}">
+                <a14:useLocalDpi xmlns:a14="http://schemas.microsoft.com/office/drawing/2010/main" val="0"/>
+              </a:ext>
+            </a:extLst>
+          </a:blip>
+          <a:srcRect/>
+          <a:stretch>
+            <a:fillRect/>
+          </a:stretch>
+        </p:blipFill>
+        <p:spPr bwMode="auto">
+          <a:xfrm>
+            <a:off x="9206650" y="556161"/>
+            <a:ext cx="2070951" cy="1232144"/>
+          </a:xfrm>
+          <a:prstGeom prst="rect">
+            <a:avLst/>
+          </a:prstGeom>
+          <a:noFill/>
+          <a:extLst>
+            <a:ext uri="{909E8E84-426E-40DD-AFC4-6F175D3DCCD1}">
+              <a14:hiddenFill xmlns:a14="http://schemas.microsoft.com/office/drawing/2010/main">
+                <a:solidFill>
+                  <a:srgbClr val="FFFFFF"/>
+                </a:solidFill>
+              </a14:hiddenFill>
+            </a:ext>
+          </a:extLst>
+        </p:spPr>
+      </p:pic>
+      <p:sp>
+        <p:nvSpPr>
+          <p:cNvPr id="5" name="TextBox 4">
+            <a:extLst>
+              <a:ext uri="{FF2B5EF4-FFF2-40B4-BE49-F238E27FC236}">
+                <a16:creationId xmlns:a16="http://schemas.microsoft.com/office/drawing/2014/main" id="{2E651E4C-A14B-8B77-54B6-74206406EED6}"/>
+              </a:ext>
+            </a:extLst>
+          </p:cNvPr>
+          <p:cNvSpPr txBox="1"/>
+          <p:nvPr/>
+        </p:nvSpPr>
+        <p:spPr>
+          <a:xfrm>
+            <a:off x="6977111" y="6407686"/>
+            <a:ext cx="5214889" cy="369332"/>
+          </a:xfrm>
+          <a:prstGeom prst="rect">
+            <a:avLst/>
+          </a:prstGeom>
+          <a:noFill/>
+        </p:spPr>
+        <p:txBody>
+          <a:bodyPr wrap="none" rtlCol="0">
+            <a:spAutoFit/>
+          </a:bodyPr>
+          <a:lstStyle/>
+          <a:p>
+            <a:r>
+              <a:rPr lang="en-DE"/>
+              <a:t>Source: </a:t>
+            </a:r>
+            <a:r>
+              <a:rPr lang="en-GB">
+                <a:hlinkClick r:id="rId6"/>
+              </a:rPr>
+              <a:t>Wikimedia (sofa)</a:t>
+            </a:r>
+            <a:r>
+              <a:rPr lang="en-GB"/>
+              <a:t>, </a:t>
+            </a:r>
+            <a:r>
+              <a:rPr lang="en-GB">
+                <a:hlinkClick r:id="rId7"/>
+              </a:rPr>
+              <a:t>Wikimedia (candle diffuser)</a:t>
+            </a:r>
+            <a:endParaRPr lang="en-DE"/>
+          </a:p>
+        </p:txBody>
+      </p:sp>
+    </p:spTree>
+    <p:extLst>
+      <p:ext uri="{BB962C8B-B14F-4D97-AF65-F5344CB8AC3E}">
+        <p14:creationId xmlns:p14="http://schemas.microsoft.com/office/powerpoint/2010/main" val="2158594933"/>
+      </p:ext>
+    </p:extLst>
+  </p:cSld>
+  <p:clrMapOvr>
+    <a:masterClrMapping/>
+  </p:clrMapOvr>
+</p:sld>
+</file>
+
 <file path=ppt/slides/slide4.xml><?xml version="1.0" encoding="utf-8"?>
 <p:sld xmlns:a="http://schemas.openxmlformats.org/drawingml/2006/main" xmlns:r="http://schemas.openxmlformats.org/officeDocument/2006/relationships" xmlns:p="http://schemas.openxmlformats.org/presentationml/2006/main">
   <p:cSld>
@@ -4721,7 +4866,7 @@
         </p:blipFill>
         <p:spPr>
           <a:xfrm>
-            <a:off x="2245264" y="3078161"/>
+            <a:off x="2349437" y="1816520"/>
             <a:ext cx="3327400" cy="3505200"/>
           </a:xfrm>
           <a:prstGeom prst="rect">
@@ -4751,7 +4896,7 @@
         </p:blipFill>
         <p:spPr>
           <a:xfrm>
-            <a:off x="6697994" y="3078161"/>
+            <a:off x="6802167" y="1816520"/>
             <a:ext cx="3327400" cy="3505200"/>
           </a:xfrm>
           <a:prstGeom prst="rect">

</xml_diff>